<commit_message>
Cosmetic  Changes to be committed: 	modified:   HTML/Videos/File_Structure/File_Structure.pptx
</commit_message>
<xml_diff>
--- a/HTML/Videos/File_Structure/File_Structure.pptx
+++ b/HTML/Videos/File_Structure/File_Structure.pptx
@@ -296,7 +296,7 @@
             <a:fld id="{1D8BD707-D9CF-40AE-B4C6-C98DA3205C09}" type="datetimeFigureOut">
               <a:rPr lang="en-US" smtClean="0"/>
               <a:pPr/>
-              <a:t>5/30/2018</a:t>
+              <a:t>6/24/2018</a:t>
             </a:fld>
             <a:endParaRPr lang="en-US"/>
           </a:p>
@@ -470,7 +470,7 @@
             <a:fld id="{1D8BD707-D9CF-40AE-B4C6-C98DA3205C09}" type="datetimeFigureOut">
               <a:rPr lang="en-US" smtClean="0"/>
               <a:pPr/>
-              <a:t>5/30/2018</a:t>
+              <a:t>6/24/2018</a:t>
             </a:fld>
             <a:endParaRPr lang="en-US"/>
           </a:p>
@@ -647,7 +647,7 @@
             <a:fld id="{1D8BD707-D9CF-40AE-B4C6-C98DA3205C09}" type="datetimeFigureOut">
               <a:rPr lang="en-US" smtClean="0"/>
               <a:pPr/>
-              <a:t>5/30/2018</a:t>
+              <a:t>6/24/2018</a:t>
             </a:fld>
             <a:endParaRPr lang="en-US"/>
           </a:p>
@@ -814,7 +814,7 @@
             <a:fld id="{1D8BD707-D9CF-40AE-B4C6-C98DA3205C09}" type="datetimeFigureOut">
               <a:rPr lang="en-US" smtClean="0"/>
               <a:pPr/>
-              <a:t>5/30/2018</a:t>
+              <a:t>6/24/2018</a:t>
             </a:fld>
             <a:endParaRPr lang="en-US"/>
           </a:p>
@@ -1057,7 +1057,7 @@
             <a:fld id="{1D8BD707-D9CF-40AE-B4C6-C98DA3205C09}" type="datetimeFigureOut">
               <a:rPr lang="en-US" smtClean="0"/>
               <a:pPr/>
-              <a:t>5/30/2018</a:t>
+              <a:t>6/24/2018</a:t>
             </a:fld>
             <a:endParaRPr lang="en-US"/>
           </a:p>
@@ -1342,7 +1342,7 @@
             <a:fld id="{1D8BD707-D9CF-40AE-B4C6-C98DA3205C09}" type="datetimeFigureOut">
               <a:rPr lang="en-US" smtClean="0"/>
               <a:pPr/>
-              <a:t>5/30/2018</a:t>
+              <a:t>6/24/2018</a:t>
             </a:fld>
             <a:endParaRPr lang="en-US"/>
           </a:p>
@@ -1761,7 +1761,7 @@
             <a:fld id="{1D8BD707-D9CF-40AE-B4C6-C98DA3205C09}" type="datetimeFigureOut">
               <a:rPr lang="en-US" smtClean="0"/>
               <a:pPr/>
-              <a:t>5/30/2018</a:t>
+              <a:t>6/24/2018</a:t>
             </a:fld>
             <a:endParaRPr lang="en-US"/>
           </a:p>
@@ -1876,7 +1876,7 @@
             <a:fld id="{1D8BD707-D9CF-40AE-B4C6-C98DA3205C09}" type="datetimeFigureOut">
               <a:rPr lang="en-US" smtClean="0"/>
               <a:pPr/>
-              <a:t>5/30/2018</a:t>
+              <a:t>6/24/2018</a:t>
             </a:fld>
             <a:endParaRPr lang="en-US"/>
           </a:p>
@@ -1968,7 +1968,7 @@
             <a:fld id="{1D8BD707-D9CF-40AE-B4C6-C98DA3205C09}" type="datetimeFigureOut">
               <a:rPr lang="en-US" smtClean="0"/>
               <a:pPr/>
-              <a:t>5/30/2018</a:t>
+              <a:t>6/24/2018</a:t>
             </a:fld>
             <a:endParaRPr lang="en-US"/>
           </a:p>
@@ -2242,7 +2242,7 @@
             <a:fld id="{1D8BD707-D9CF-40AE-B4C6-C98DA3205C09}" type="datetimeFigureOut">
               <a:rPr lang="en-US" smtClean="0"/>
               <a:pPr/>
-              <a:t>5/30/2018</a:t>
+              <a:t>6/24/2018</a:t>
             </a:fld>
             <a:endParaRPr lang="en-US"/>
           </a:p>
@@ -2492,7 +2492,7 @@
             <a:fld id="{1D8BD707-D9CF-40AE-B4C6-C98DA3205C09}" type="datetimeFigureOut">
               <a:rPr lang="en-US" smtClean="0"/>
               <a:pPr/>
-              <a:t>5/30/2018</a:t>
+              <a:t>6/24/2018</a:t>
             </a:fld>
             <a:endParaRPr lang="en-US"/>
           </a:p>
@@ -2702,7 +2702,7 @@
             <a:fld id="{1D8BD707-D9CF-40AE-B4C6-C98DA3205C09}" type="datetimeFigureOut">
               <a:rPr lang="en-US" smtClean="0"/>
               <a:pPr/>
-              <a:t>5/30/2018</a:t>
+              <a:t>6/24/2018</a:t>
             </a:fld>
             <a:endParaRPr lang="en-US"/>
           </a:p>
@@ -24536,12 +24536,12 @@
           <a:p>
             <a:pPr algn="just"/>
             <a:r>
-              <a:rPr lang="en-GB" dirty="0" smtClean="0">
+              <a:rPr lang="en-GB" smtClean="0">
                 <a:solidFill>
                   <a:prstClr val="black"/>
                 </a:solidFill>
               </a:rPr>
-              <a:t>Were </a:t>
+              <a:t>Was </a:t>
             </a:r>
             <a:r>
               <a:rPr lang="en-GB" b="1" dirty="0" smtClean="0">
@@ -30348,15 +30348,7 @@
                   <a:prstClr val="black"/>
                 </a:solidFill>
               </a:rPr>
-              <a:t>… </a:t>
-            </a:r>
-            <a:r>
-              <a:rPr lang="en-GB" dirty="0" smtClean="0">
-                <a:solidFill>
-                  <a:prstClr val="black"/>
-                </a:solidFill>
-              </a:rPr>
-              <a:t>So:</a:t>
+              <a:t>… So:</a:t>
             </a:r>
             <a:endParaRPr lang="en-GB" dirty="0">
               <a:solidFill>
@@ -31434,12 +31426,6 @@
               </a:rPr>
               <a:t>.</a:t>
             </a:r>
-            <a:endParaRPr lang="en-GB" sz="2600" b="1" dirty="0">
-              <a:solidFill>
-                <a:prstClr val="black"/>
-              </a:solidFill>
-              <a:latin typeface="Courier New" panose="02070309020205020404" pitchFamily="49" charset="0"/>
-            </a:endParaRPr>
           </a:p>
         </p:txBody>
       </p:sp>
@@ -35042,15 +35028,7 @@
                   <a:prstClr val="black"/>
                 </a:solidFill>
               </a:rPr>
-              <a:t>”)</a:t>
-            </a:r>
-            <a:r>
-              <a:rPr lang="en-GB" dirty="0" smtClean="0">
-                <a:solidFill>
-                  <a:prstClr val="black"/>
-                </a:solidFill>
-              </a:rPr>
-              <a:t>.</a:t>
+              <a:t>”).</a:t>
             </a:r>
             <a:endParaRPr lang="en-GB" dirty="0">
               <a:solidFill>
@@ -35314,16 +35292,7 @@
                 </a:solidFill>
                 <a:latin typeface="Courier New" panose="02070309020205020404" pitchFamily="49" charset="0"/>
               </a:rPr>
-              <a:t>./../</a:t>
-            </a:r>
-            <a:r>
-              <a:rPr lang="en-GB" sz="2600" b="1" dirty="0" smtClean="0">
-                <a:solidFill>
-                  <a:prstClr val="black"/>
-                </a:solidFill>
-                <a:latin typeface="Courier New" panose="02070309020205020404" pitchFamily="49" charset="0"/>
-              </a:rPr>
-              <a:t>d1</a:t>
+              <a:t>./../d1</a:t>
             </a:r>
             <a:endParaRPr lang="en-GB" sz="2600" b="1" dirty="0">
               <a:solidFill>
@@ -35375,16 +35344,7 @@
                 </a:solidFill>
                 <a:latin typeface="Courier New" panose="02070309020205020404" pitchFamily="49" charset="0"/>
               </a:rPr>
-              <a:t>./../</a:t>
-            </a:r>
-            <a:r>
-              <a:rPr lang="en-GB" sz="2600" b="1" dirty="0" smtClean="0">
-                <a:solidFill>
-                  <a:prstClr val="black"/>
-                </a:solidFill>
-                <a:latin typeface="Courier New" panose="02070309020205020404" pitchFamily="49" charset="0"/>
-              </a:rPr>
-              <a:t>d1/e</a:t>
+              <a:t>./../d1/e</a:t>
             </a:r>
             <a:endParaRPr lang="en-GB" sz="2600" b="1" dirty="0">
               <a:solidFill>

</xml_diff>